<commit_message>
feat: simplify cloud provider creds management
Add a new step which contains the logic of setting credentials ready
for access to a cloud provider. They have been isolated into a step so
the step can be omitted if using a role for the agent rather than
explicit crednetials.
</commit_message>
<xml_diff>
--- a/assets/overview.pptx
+++ b/assets/overview.pptx
@@ -243,7 +243,7 @@
           <a:p>
             <a:fld id="{D862F650-2B31-C743-8CC3-C48CC04EFD79}" type="datetimeFigureOut">
               <a:rPr lang="en-US" smtClean="0"/>
-              <a:t>3/5/2021</a:t>
+              <a:t>3/11/2021</a:t>
             </a:fld>
             <a:endParaRPr lang="en-US"/>
           </a:p>
@@ -413,7 +413,7 @@
           <a:p>
             <a:fld id="{D862F650-2B31-C743-8CC3-C48CC04EFD79}" type="datetimeFigureOut">
               <a:rPr lang="en-US" smtClean="0"/>
-              <a:t>3/5/2021</a:t>
+              <a:t>3/11/2021</a:t>
             </a:fld>
             <a:endParaRPr lang="en-US"/>
           </a:p>
@@ -593,7 +593,7 @@
           <a:p>
             <a:fld id="{D862F650-2B31-C743-8CC3-C48CC04EFD79}" type="datetimeFigureOut">
               <a:rPr lang="en-US" smtClean="0"/>
-              <a:t>3/5/2021</a:t>
+              <a:t>3/11/2021</a:t>
             </a:fld>
             <a:endParaRPr lang="en-US"/>
           </a:p>
@@ -763,7 +763,7 @@
           <a:p>
             <a:fld id="{D862F650-2B31-C743-8CC3-C48CC04EFD79}" type="datetimeFigureOut">
               <a:rPr lang="en-US" smtClean="0"/>
-              <a:t>3/5/2021</a:t>
+              <a:t>3/11/2021</a:t>
             </a:fld>
             <a:endParaRPr lang="en-US"/>
           </a:p>
@@ -1007,7 +1007,7 @@
           <a:p>
             <a:fld id="{D862F650-2B31-C743-8CC3-C48CC04EFD79}" type="datetimeFigureOut">
               <a:rPr lang="en-US" smtClean="0"/>
-              <a:t>3/5/2021</a:t>
+              <a:t>3/11/2021</a:t>
             </a:fld>
             <a:endParaRPr lang="en-US"/>
           </a:p>
@@ -1239,7 +1239,7 @@
           <a:p>
             <a:fld id="{D862F650-2B31-C743-8CC3-C48CC04EFD79}" type="datetimeFigureOut">
               <a:rPr lang="en-US" smtClean="0"/>
-              <a:t>3/5/2021</a:t>
+              <a:t>3/11/2021</a:t>
             </a:fld>
             <a:endParaRPr lang="en-US"/>
           </a:p>
@@ -1606,7 +1606,7 @@
           <a:p>
             <a:fld id="{D862F650-2B31-C743-8CC3-C48CC04EFD79}" type="datetimeFigureOut">
               <a:rPr lang="en-US" smtClean="0"/>
-              <a:t>3/5/2021</a:t>
+              <a:t>3/11/2021</a:t>
             </a:fld>
             <a:endParaRPr lang="en-US"/>
           </a:p>
@@ -1724,7 +1724,7 @@
           <a:p>
             <a:fld id="{D862F650-2B31-C743-8CC3-C48CC04EFD79}" type="datetimeFigureOut">
               <a:rPr lang="en-US" smtClean="0"/>
-              <a:t>3/5/2021</a:t>
+              <a:t>3/11/2021</a:t>
             </a:fld>
             <a:endParaRPr lang="en-US"/>
           </a:p>
@@ -1819,7 +1819,7 @@
           <a:p>
             <a:fld id="{D862F650-2B31-C743-8CC3-C48CC04EFD79}" type="datetimeFigureOut">
               <a:rPr lang="en-US" smtClean="0"/>
-              <a:t>3/5/2021</a:t>
+              <a:t>3/11/2021</a:t>
             </a:fld>
             <a:endParaRPr lang="en-US"/>
           </a:p>
@@ -2096,7 +2096,7 @@
           <a:p>
             <a:fld id="{D862F650-2B31-C743-8CC3-C48CC04EFD79}" type="datetimeFigureOut">
               <a:rPr lang="en-US" smtClean="0"/>
-              <a:t>3/5/2021</a:t>
+              <a:t>3/11/2021</a:t>
             </a:fld>
             <a:endParaRPr lang="en-US"/>
           </a:p>
@@ -2353,7 +2353,7 @@
           <a:p>
             <a:fld id="{D862F650-2B31-C743-8CC3-C48CC04EFD79}" type="datetimeFigureOut">
               <a:rPr lang="en-US" smtClean="0"/>
-              <a:t>3/5/2021</a:t>
+              <a:t>3/11/2021</a:t>
             </a:fld>
             <a:endParaRPr lang="en-US"/>
           </a:p>
@@ -2566,7 +2566,7 @@
           <a:p>
             <a:fld id="{D862F650-2B31-C743-8CC3-C48CC04EFD79}" type="datetimeFigureOut">
               <a:rPr lang="en-US" smtClean="0"/>
-              <a:t>3/5/2021</a:t>
+              <a:t>3/11/2021</a:t>
             </a:fld>
             <a:endParaRPr lang="en-US"/>
           </a:p>
@@ -5591,9 +5591,10 @@
           <a:p>
             <a:pPr algn="ctr"/>
             <a:r>
-              <a:rPr lang="en-AU" sz="1600" dirty="0"/>
-              <a:t>hamlet-streams</a:t>
+              <a:rPr lang="en-AU" sz="1600"/>
+              <a:t>jenkins-streams</a:t>
             </a:r>
+            <a:endParaRPr lang="en-AU" sz="1600" dirty="0"/>
           </a:p>
         </p:txBody>
       </p:sp>

</xml_diff>